<commit_message>
multi language, update code, fix error
</commit_message>
<xml_diff>
--- a/document_final/final_project.pptx
+++ b/document_final/final_project.pptx
@@ -151,7 +151,7 @@
   </p:defaultTextStyle>
   <p:extLst>
     <p:ext uri="{EFAFB233-063F-42B5-8137-9DF3F51BA10A}">
-      <p15:sldGuideLst xmlns="" xmlns:p15="http://schemas.microsoft.com/office/powerpoint/2012/main">
+      <p15:sldGuideLst xmlns:p15="http://schemas.microsoft.com/office/powerpoint/2012/main" xmlns="">
         <p15:guide id="1" orient="horz" pos="1800">
           <p15:clr>
             <a:srgbClr val="A4A3A4"/>
@@ -3391,25 +3391,25 @@
     </dgm:pt>
   </dgm:ptLst>
   <dgm:cxnLst>
+    <dgm:cxn modelId="{1FDBE864-539D-408E-85E3-1A02F3608F1C}" srcId="{BF70A2BC-F55C-4C5C-95B7-DC5329E673A7}" destId="{736E50BE-5DBE-4B69-BB71-5F8987BFA341}" srcOrd="1" destOrd="0" parTransId="{3B4F6EE4-EC5C-42AC-8CBF-32D92376F0BF}" sibTransId="{254AF9A3-BDC6-46B7-8A17-B020012CE1D9}"/>
+    <dgm:cxn modelId="{611282F5-C145-40D4-B62A-C4BC7785D60B}" srcId="{BF70A2BC-F55C-4C5C-95B7-DC5329E673A7}" destId="{EE7B76D8-5A04-4610-99F6-794C3E59E208}" srcOrd="0" destOrd="0" parTransId="{7E48AAC2-D084-4E2E-92D2-597BBE075778}" sibTransId="{D175A62C-A264-4276-921B-FDDD5ECF06E0}"/>
+    <dgm:cxn modelId="{C8CA4020-75E3-4D9B-B37A-62CF1A0C4F5C}" type="presOf" srcId="{6EDED262-2059-44C0-BDC3-E8A562552D4A}" destId="{83425E95-6BB5-4ED0-8E47-2842AE508185}" srcOrd="1" destOrd="4" presId="urn:microsoft.com/office/officeart/2005/8/layout/vList4"/>
+    <dgm:cxn modelId="{1C094BB6-EF81-45AF-BA05-11FCC2EE5DDD}" type="presOf" srcId="{F5795272-2767-4B7B-B212-9E4DE40F1919}" destId="{83425E95-6BB5-4ED0-8E47-2842AE508185}" srcOrd="1" destOrd="3" presId="urn:microsoft.com/office/officeart/2005/8/layout/vList4"/>
+    <dgm:cxn modelId="{91D48274-C49D-474A-A3F4-F02B29E13019}" type="presOf" srcId="{BF70A2BC-F55C-4C5C-95B7-DC5329E673A7}" destId="{0B906849-CFF8-4E78-BA96-568A3E6D2C53}" srcOrd="0" destOrd="0" presId="urn:microsoft.com/office/officeart/2005/8/layout/vList4"/>
+    <dgm:cxn modelId="{87FE3007-F02A-4C01-B3B5-E9BF4D846AA4}" type="presOf" srcId="{BF70A2BC-F55C-4C5C-95B7-DC5329E673A7}" destId="{83425E95-6BB5-4ED0-8E47-2842AE508185}" srcOrd="1" destOrd="0" presId="urn:microsoft.com/office/officeart/2005/8/layout/vList4"/>
+    <dgm:cxn modelId="{557A9957-A3B3-4C44-851D-ED52A8F08FEA}" srcId="{BF70A2BC-F55C-4C5C-95B7-DC5329E673A7}" destId="{98EFCF74-7924-412A-8CEE-C5C0D45AD7EF}" srcOrd="4" destOrd="0" parTransId="{10246765-7A4B-40D5-87EF-258886DF4828}" sibTransId="{0F1DF7B5-6BE4-444C-A221-A8EADC672320}"/>
+    <dgm:cxn modelId="{88D54E45-8497-46CC-94E2-AA6928FF62F7}" srcId="{BF70A2BC-F55C-4C5C-95B7-DC5329E673A7}" destId="{6EDED262-2059-44C0-BDC3-E8A562552D4A}" srcOrd="3" destOrd="0" parTransId="{36497893-9948-466F-8251-4CB6C0746282}" sibTransId="{0199D02C-D2EB-42E6-A24A-8D59E41972D6}"/>
+    <dgm:cxn modelId="{6C2D4AFE-CA01-4171-B49A-766B98C20435}" type="presOf" srcId="{EE7B76D8-5A04-4610-99F6-794C3E59E208}" destId="{0B906849-CFF8-4E78-BA96-568A3E6D2C53}" srcOrd="0" destOrd="1" presId="urn:microsoft.com/office/officeart/2005/8/layout/vList4"/>
+    <dgm:cxn modelId="{8B7C893A-95E3-4D5A-9895-C79BAC216C7A}" srcId="{BF70A2BC-F55C-4C5C-95B7-DC5329E673A7}" destId="{F5795272-2767-4B7B-B212-9E4DE40F1919}" srcOrd="2" destOrd="0" parTransId="{359EF25B-C331-41DC-A30E-B5669E0B0D9E}" sibTransId="{1E8F3A51-16AC-4E69-924F-7BF286468B6E}"/>
+    <dgm:cxn modelId="{6BA80430-A569-46DC-B608-B8179A2836FD}" type="presOf" srcId="{736E50BE-5DBE-4B69-BB71-5F8987BFA341}" destId="{0B906849-CFF8-4E78-BA96-568A3E6D2C53}" srcOrd="0" destOrd="2" presId="urn:microsoft.com/office/officeart/2005/8/layout/vList4"/>
+    <dgm:cxn modelId="{B65ED16C-B23A-4D25-8A03-96CC0D917A89}" srcId="{E02A8243-9315-404B-83BC-2ADD496085A6}" destId="{BF70A2BC-F55C-4C5C-95B7-DC5329E673A7}" srcOrd="0" destOrd="0" parTransId="{DCFA195B-0FF9-400D-8239-5FAF58DF5EB0}" sibTransId="{A85A0E71-91E1-4984-AB29-1282732BDCE6}"/>
+    <dgm:cxn modelId="{1EF8B61E-876B-45FD-967F-F850A9679371}" type="presOf" srcId="{98EFCF74-7924-412A-8CEE-C5C0D45AD7EF}" destId="{83425E95-6BB5-4ED0-8E47-2842AE508185}" srcOrd="1" destOrd="5" presId="urn:microsoft.com/office/officeart/2005/8/layout/vList4"/>
+    <dgm:cxn modelId="{B397A2C3-98E6-448F-B710-059498D25BAD}" type="presOf" srcId="{EE7B76D8-5A04-4610-99F6-794C3E59E208}" destId="{83425E95-6BB5-4ED0-8E47-2842AE508185}" srcOrd="1" destOrd="1" presId="urn:microsoft.com/office/officeart/2005/8/layout/vList4"/>
+    <dgm:cxn modelId="{68D061E4-E0EF-4E76-A836-7CF782A8ADB7}" type="presOf" srcId="{98EFCF74-7924-412A-8CEE-C5C0D45AD7EF}" destId="{0B906849-CFF8-4E78-BA96-568A3E6D2C53}" srcOrd="0" destOrd="5" presId="urn:microsoft.com/office/officeart/2005/8/layout/vList4"/>
+    <dgm:cxn modelId="{F2ED3A6A-6C08-4211-ACA2-D18458EDCB9B}" type="presOf" srcId="{E02A8243-9315-404B-83BC-2ADD496085A6}" destId="{AD2407BE-247E-47DD-A328-3C7E353C1415}" srcOrd="0" destOrd="0" presId="urn:microsoft.com/office/officeart/2005/8/layout/vList4"/>
+    <dgm:cxn modelId="{75B6E60F-1189-4265-991A-B9415EBAF333}" type="presOf" srcId="{736E50BE-5DBE-4B69-BB71-5F8987BFA341}" destId="{83425E95-6BB5-4ED0-8E47-2842AE508185}" srcOrd="1" destOrd="2" presId="urn:microsoft.com/office/officeart/2005/8/layout/vList4"/>
+    <dgm:cxn modelId="{AC8AD4D2-DFF7-48F1-90BB-DA6AF5AD6E3C}" type="presOf" srcId="{6EDED262-2059-44C0-BDC3-E8A562552D4A}" destId="{0B906849-CFF8-4E78-BA96-568A3E6D2C53}" srcOrd="0" destOrd="4" presId="urn:microsoft.com/office/officeart/2005/8/layout/vList4"/>
     <dgm:cxn modelId="{A307EB41-74F3-4A4A-950A-F49EE17784DF}" type="presOf" srcId="{F5795272-2767-4B7B-B212-9E4DE40F1919}" destId="{0B906849-CFF8-4E78-BA96-568A3E6D2C53}" srcOrd="0" destOrd="3" presId="urn:microsoft.com/office/officeart/2005/8/layout/vList4"/>
-    <dgm:cxn modelId="{1EF8B61E-876B-45FD-967F-F850A9679371}" type="presOf" srcId="{98EFCF74-7924-412A-8CEE-C5C0D45AD7EF}" destId="{83425E95-6BB5-4ED0-8E47-2842AE508185}" srcOrd="1" destOrd="5" presId="urn:microsoft.com/office/officeart/2005/8/layout/vList4"/>
-    <dgm:cxn modelId="{AC8AD4D2-DFF7-48F1-90BB-DA6AF5AD6E3C}" type="presOf" srcId="{6EDED262-2059-44C0-BDC3-E8A562552D4A}" destId="{0B906849-CFF8-4E78-BA96-568A3E6D2C53}" srcOrd="0" destOrd="4" presId="urn:microsoft.com/office/officeart/2005/8/layout/vList4"/>
-    <dgm:cxn modelId="{75B6E60F-1189-4265-991A-B9415EBAF333}" type="presOf" srcId="{736E50BE-5DBE-4B69-BB71-5F8987BFA341}" destId="{83425E95-6BB5-4ED0-8E47-2842AE508185}" srcOrd="1" destOrd="2" presId="urn:microsoft.com/office/officeart/2005/8/layout/vList4"/>
-    <dgm:cxn modelId="{68D061E4-E0EF-4E76-A836-7CF782A8ADB7}" type="presOf" srcId="{98EFCF74-7924-412A-8CEE-C5C0D45AD7EF}" destId="{0B906849-CFF8-4E78-BA96-568A3E6D2C53}" srcOrd="0" destOrd="5" presId="urn:microsoft.com/office/officeart/2005/8/layout/vList4"/>
-    <dgm:cxn modelId="{6BA80430-A569-46DC-B608-B8179A2836FD}" type="presOf" srcId="{736E50BE-5DBE-4B69-BB71-5F8987BFA341}" destId="{0B906849-CFF8-4E78-BA96-568A3E6D2C53}" srcOrd="0" destOrd="2" presId="urn:microsoft.com/office/officeart/2005/8/layout/vList4"/>
-    <dgm:cxn modelId="{87FE3007-F02A-4C01-B3B5-E9BF4D846AA4}" type="presOf" srcId="{BF70A2BC-F55C-4C5C-95B7-DC5329E673A7}" destId="{83425E95-6BB5-4ED0-8E47-2842AE508185}" srcOrd="1" destOrd="0" presId="urn:microsoft.com/office/officeart/2005/8/layout/vList4"/>
-    <dgm:cxn modelId="{1C094BB6-EF81-45AF-BA05-11FCC2EE5DDD}" type="presOf" srcId="{F5795272-2767-4B7B-B212-9E4DE40F1919}" destId="{83425E95-6BB5-4ED0-8E47-2842AE508185}" srcOrd="1" destOrd="3" presId="urn:microsoft.com/office/officeart/2005/8/layout/vList4"/>
-    <dgm:cxn modelId="{8B7C893A-95E3-4D5A-9895-C79BAC216C7A}" srcId="{BF70A2BC-F55C-4C5C-95B7-DC5329E673A7}" destId="{F5795272-2767-4B7B-B212-9E4DE40F1919}" srcOrd="2" destOrd="0" parTransId="{359EF25B-C331-41DC-A30E-B5669E0B0D9E}" sibTransId="{1E8F3A51-16AC-4E69-924F-7BF286468B6E}"/>
-    <dgm:cxn modelId="{6C2D4AFE-CA01-4171-B49A-766B98C20435}" type="presOf" srcId="{EE7B76D8-5A04-4610-99F6-794C3E59E208}" destId="{0B906849-CFF8-4E78-BA96-568A3E6D2C53}" srcOrd="0" destOrd="1" presId="urn:microsoft.com/office/officeart/2005/8/layout/vList4"/>
-    <dgm:cxn modelId="{C8CA4020-75E3-4D9B-B37A-62CF1A0C4F5C}" type="presOf" srcId="{6EDED262-2059-44C0-BDC3-E8A562552D4A}" destId="{83425E95-6BB5-4ED0-8E47-2842AE508185}" srcOrd="1" destOrd="4" presId="urn:microsoft.com/office/officeart/2005/8/layout/vList4"/>
-    <dgm:cxn modelId="{91D48274-C49D-474A-A3F4-F02B29E13019}" type="presOf" srcId="{BF70A2BC-F55C-4C5C-95B7-DC5329E673A7}" destId="{0B906849-CFF8-4E78-BA96-568A3E6D2C53}" srcOrd="0" destOrd="0" presId="urn:microsoft.com/office/officeart/2005/8/layout/vList4"/>
-    <dgm:cxn modelId="{F2ED3A6A-6C08-4211-ACA2-D18458EDCB9B}" type="presOf" srcId="{E02A8243-9315-404B-83BC-2ADD496085A6}" destId="{AD2407BE-247E-47DD-A328-3C7E353C1415}" srcOrd="0" destOrd="0" presId="urn:microsoft.com/office/officeart/2005/8/layout/vList4"/>
-    <dgm:cxn modelId="{1FDBE864-539D-408E-85E3-1A02F3608F1C}" srcId="{BF70A2BC-F55C-4C5C-95B7-DC5329E673A7}" destId="{736E50BE-5DBE-4B69-BB71-5F8987BFA341}" srcOrd="1" destOrd="0" parTransId="{3B4F6EE4-EC5C-42AC-8CBF-32D92376F0BF}" sibTransId="{254AF9A3-BDC6-46B7-8A17-B020012CE1D9}"/>
-    <dgm:cxn modelId="{B65ED16C-B23A-4D25-8A03-96CC0D917A89}" srcId="{E02A8243-9315-404B-83BC-2ADD496085A6}" destId="{BF70A2BC-F55C-4C5C-95B7-DC5329E673A7}" srcOrd="0" destOrd="0" parTransId="{DCFA195B-0FF9-400D-8239-5FAF58DF5EB0}" sibTransId="{A85A0E71-91E1-4984-AB29-1282732BDCE6}"/>
-    <dgm:cxn modelId="{611282F5-C145-40D4-B62A-C4BC7785D60B}" srcId="{BF70A2BC-F55C-4C5C-95B7-DC5329E673A7}" destId="{EE7B76D8-5A04-4610-99F6-794C3E59E208}" srcOrd="0" destOrd="0" parTransId="{7E48AAC2-D084-4E2E-92D2-597BBE075778}" sibTransId="{D175A62C-A264-4276-921B-FDDD5ECF06E0}"/>
-    <dgm:cxn modelId="{B397A2C3-98E6-448F-B710-059498D25BAD}" type="presOf" srcId="{EE7B76D8-5A04-4610-99F6-794C3E59E208}" destId="{83425E95-6BB5-4ED0-8E47-2842AE508185}" srcOrd="1" destOrd="1" presId="urn:microsoft.com/office/officeart/2005/8/layout/vList4"/>
-    <dgm:cxn modelId="{88D54E45-8497-46CC-94E2-AA6928FF62F7}" srcId="{BF70A2BC-F55C-4C5C-95B7-DC5329E673A7}" destId="{6EDED262-2059-44C0-BDC3-E8A562552D4A}" srcOrd="3" destOrd="0" parTransId="{36497893-9948-466F-8251-4CB6C0746282}" sibTransId="{0199D02C-D2EB-42E6-A24A-8D59E41972D6}"/>
-    <dgm:cxn modelId="{557A9957-A3B3-4C44-851D-ED52A8F08FEA}" srcId="{BF70A2BC-F55C-4C5C-95B7-DC5329E673A7}" destId="{98EFCF74-7924-412A-8CEE-C5C0D45AD7EF}" srcOrd="4" destOrd="0" parTransId="{10246765-7A4B-40D5-87EF-258886DF4828}" sibTransId="{0F1DF7B5-6BE4-444C-A221-A8EADC672320}"/>
     <dgm:cxn modelId="{61BFDC48-0F91-455D-9D3D-2E4183D1A2AC}" type="presParOf" srcId="{AD2407BE-247E-47DD-A328-3C7E353C1415}" destId="{A483763C-A1A2-4AC2-B0F2-F1CB7FCABC72}" srcOrd="0" destOrd="0" presId="urn:microsoft.com/office/officeart/2005/8/layout/vList4"/>
     <dgm:cxn modelId="{4B7CB803-0720-42C6-9E1D-A4907B6D5616}" type="presParOf" srcId="{A483763C-A1A2-4AC2-B0F2-F1CB7FCABC72}" destId="{0B906849-CFF8-4E78-BA96-568A3E6D2C53}" srcOrd="0" destOrd="0" presId="urn:microsoft.com/office/officeart/2005/8/layout/vList4"/>
     <dgm:cxn modelId="{310C31E8-1907-456D-9F03-3D350897D021}" type="presParOf" srcId="{A483763C-A1A2-4AC2-B0F2-F1CB7FCABC72}" destId="{685997F9-7933-4967-B61A-2621F57A5682}" srcOrd="1" destOrd="0" presId="urn:microsoft.com/office/officeart/2005/8/layout/vList4"/>
@@ -3515,14 +3515,7 @@
               <a:latin typeface="Times New Roman" panose="02020603050405020304" pitchFamily="18" charset="0"/>
               <a:cs typeface="Times New Roman" panose="02020603050405020304" pitchFamily="18" charset="0"/>
             </a:rPr>
-            <a:t>Update </a:t>
-          </a:r>
-          <a:r>
-            <a:rPr lang="en-US" sz="1100" smtClean="0">
-              <a:latin typeface="Times New Roman" panose="02020603050405020304" pitchFamily="18" charset="0"/>
-              <a:cs typeface="Times New Roman" panose="02020603050405020304" pitchFamily="18" charset="0"/>
-            </a:rPr>
-            <a:t>profile</a:t>
+            <a:t>Update profile</a:t>
           </a:r>
           <a:endParaRPr lang="en-US" sz="1100">
             <a:latin typeface="Times New Roman" panose="02020603050405020304" pitchFamily="18" charset="0"/>
@@ -4070,14 +4063,7 @@
               <a:latin typeface="Times New Roman" panose="02020603050405020304" pitchFamily="18" charset="0"/>
               <a:cs typeface="Times New Roman" panose="02020603050405020304" pitchFamily="18" charset="0"/>
             </a:rPr>
-            <a:t>Update </a:t>
-          </a:r>
-          <a:r>
-            <a:rPr lang="en-US" sz="1100" smtClean="0">
-              <a:latin typeface="Times New Roman" panose="02020603050405020304" pitchFamily="18" charset="0"/>
-              <a:cs typeface="Times New Roman" panose="02020603050405020304" pitchFamily="18" charset="0"/>
-            </a:rPr>
-            <a:t>profile</a:t>
+            <a:t>Update profile</a:t>
           </a:r>
           <a:endParaRPr lang="en-US" sz="1100">
             <a:latin typeface="Times New Roman" panose="02020603050405020304" pitchFamily="18" charset="0"/>
@@ -5590,6 +5576,13 @@
     <dgm:pt modelId="{58EE271B-D39A-4B11-B241-6E3F71FA2565}" type="pres">
       <dgm:prSet presAssocID="{8B311CEE-CFBE-4DE2-8DA9-CFB266F73D9C}" presName="Name48" presStyleLbl="parChTrans1D3" presStyleIdx="6" presStyleCnt="27"/>
       <dgm:spPr/>
+      <dgm:t>
+        <a:bodyPr/>
+        <a:lstStyle/>
+        <a:p>
+          <a:endParaRPr lang="en-US"/>
+        </a:p>
+      </dgm:t>
     </dgm:pt>
     <dgm:pt modelId="{ED0DF8A9-7D15-43FE-AAB1-0ECF53946D41}" type="pres">
       <dgm:prSet presAssocID="{6D9B7A75-A72B-4D7F-8219-8867F77F8626}" presName="hierRoot2" presStyleCnt="0">
@@ -5640,6 +5633,13 @@
     <dgm:pt modelId="{17C1E7FC-6F2A-41FB-B7DF-280B87F90EF7}" type="pres">
       <dgm:prSet presAssocID="{54B06A9E-4B04-404E-9EE5-93E3CC9AC608}" presName="Name48" presStyleLbl="parChTrans1D3" presStyleIdx="7" presStyleCnt="27"/>
       <dgm:spPr/>
+      <dgm:t>
+        <a:bodyPr/>
+        <a:lstStyle/>
+        <a:p>
+          <a:endParaRPr lang="en-US"/>
+        </a:p>
+      </dgm:t>
     </dgm:pt>
     <dgm:pt modelId="{0BC0D740-4266-41BF-B756-03630926070A}" type="pres">
       <dgm:prSet presAssocID="{60280228-D7F2-4FFE-A313-79234C73281A}" presName="hierRoot2" presStyleCnt="0">
@@ -5690,6 +5690,13 @@
     <dgm:pt modelId="{FD6AEB5E-7237-4595-97E4-7CDA517F0012}" type="pres">
       <dgm:prSet presAssocID="{00AB6C5E-3CE5-469C-89CC-BC371F4F6EDA}" presName="Name48" presStyleLbl="parChTrans1D3" presStyleIdx="8" presStyleCnt="27"/>
       <dgm:spPr/>
+      <dgm:t>
+        <a:bodyPr/>
+        <a:lstStyle/>
+        <a:p>
+          <a:endParaRPr lang="en-US"/>
+        </a:p>
+      </dgm:t>
     </dgm:pt>
     <dgm:pt modelId="{9F06A579-0033-4CDC-9C96-E589D70C160B}" type="pres">
       <dgm:prSet presAssocID="{95A9FD75-3B8B-4A2F-927A-8BD12A964AEA}" presName="hierRoot2" presStyleCnt="0">
@@ -5740,6 +5747,13 @@
     <dgm:pt modelId="{EB72A014-4944-41A2-9708-C2EB046BEA9D}" type="pres">
       <dgm:prSet presAssocID="{4E099EF7-E8FA-4D77-A6E0-68DBEEC75AD9}" presName="Name48" presStyleLbl="parChTrans1D3" presStyleIdx="9" presStyleCnt="27"/>
       <dgm:spPr/>
+      <dgm:t>
+        <a:bodyPr/>
+        <a:lstStyle/>
+        <a:p>
+          <a:endParaRPr lang="en-US"/>
+        </a:p>
+      </dgm:t>
     </dgm:pt>
     <dgm:pt modelId="{371B38F6-4C81-4909-9CC0-D9812688B52E}" type="pres">
       <dgm:prSet presAssocID="{A0CDC878-CAFD-4482-B555-79AD8166CA88}" presName="hierRoot2" presStyleCnt="0">
@@ -6130,6 +6144,13 @@
     <dgm:pt modelId="{E32D6E50-930D-464B-B97D-0454A54F4915}" type="pres">
       <dgm:prSet presAssocID="{7202EE17-03E1-4565-99FA-F04CD3222F5E}" presName="Name48" presStyleLbl="parChTrans1D3" presStyleIdx="13" presStyleCnt="27"/>
       <dgm:spPr/>
+      <dgm:t>
+        <a:bodyPr/>
+        <a:lstStyle/>
+        <a:p>
+          <a:endParaRPr lang="en-US"/>
+        </a:p>
+      </dgm:t>
     </dgm:pt>
     <dgm:pt modelId="{8FD1C435-A671-4980-9884-6E57AF8CE762}" type="pres">
       <dgm:prSet presAssocID="{F970E238-8374-4E8E-8D7B-BD43A041F666}" presName="hierRoot2" presStyleCnt="0">
@@ -6265,6 +6286,13 @@
     <dgm:pt modelId="{7B84349B-DF32-440C-823E-0B3C97F2CB10}" type="pres">
       <dgm:prSet presAssocID="{B7C4B8C3-7AC8-45EC-8364-E8D4B6ED7457}" presName="Name48" presStyleLbl="parChTrans1D3" presStyleIdx="15" presStyleCnt="27"/>
       <dgm:spPr/>
+      <dgm:t>
+        <a:bodyPr/>
+        <a:lstStyle/>
+        <a:p>
+          <a:endParaRPr lang="en-US"/>
+        </a:p>
+      </dgm:t>
     </dgm:pt>
     <dgm:pt modelId="{CABBE1CE-935F-4033-8F99-EAB0E9C7CA76}" type="pres">
       <dgm:prSet presAssocID="{581F54FD-3D5F-4290-B8EE-8D508C39217A}" presName="hierRoot2" presStyleCnt="0">
@@ -6315,6 +6343,13 @@
     <dgm:pt modelId="{E2FC642D-C4D7-4F21-8978-C2C6C16D916E}" type="pres">
       <dgm:prSet presAssocID="{8074AAC0-FEAD-458A-AD45-2A1B0F9C4DBE}" presName="Name48" presStyleLbl="parChTrans1D3" presStyleIdx="16" presStyleCnt="27"/>
       <dgm:spPr/>
+      <dgm:t>
+        <a:bodyPr/>
+        <a:lstStyle/>
+        <a:p>
+          <a:endParaRPr lang="en-US"/>
+        </a:p>
+      </dgm:t>
     </dgm:pt>
     <dgm:pt modelId="{4718C78F-8384-43CA-9D9B-15235E548FF0}" type="pres">
       <dgm:prSet presAssocID="{A151A4F0-7946-4437-9234-0E504CCA1D3F}" presName="hierRoot2" presStyleCnt="0">
@@ -6365,6 +6400,13 @@
     <dgm:pt modelId="{B5E40CA7-2590-490F-9BFC-3167DAFC8852}" type="pres">
       <dgm:prSet presAssocID="{169E703C-C691-4BD8-A432-D6AF61DE03A2}" presName="Name48" presStyleLbl="parChTrans1D3" presStyleIdx="17" presStyleCnt="27"/>
       <dgm:spPr/>
+      <dgm:t>
+        <a:bodyPr/>
+        <a:lstStyle/>
+        <a:p>
+          <a:endParaRPr lang="en-US"/>
+        </a:p>
+      </dgm:t>
     </dgm:pt>
     <dgm:pt modelId="{676DF404-DD90-43D3-86EB-640E68276725}" type="pres">
       <dgm:prSet presAssocID="{FDBB0B66-E7F2-4EA7-B793-182694B0CF9B}" presName="hierRoot2" presStyleCnt="0">
@@ -6415,6 +6457,13 @@
     <dgm:pt modelId="{B7A11BC1-8905-4253-BDB9-6D99B7274AAE}" type="pres">
       <dgm:prSet presAssocID="{FE470172-7674-459F-AD89-B29EA3FEB8CA}" presName="Name48" presStyleLbl="parChTrans1D3" presStyleIdx="18" presStyleCnt="27"/>
       <dgm:spPr/>
+      <dgm:t>
+        <a:bodyPr/>
+        <a:lstStyle/>
+        <a:p>
+          <a:endParaRPr lang="en-US"/>
+        </a:p>
+      </dgm:t>
     </dgm:pt>
     <dgm:pt modelId="{C3CDE9CB-A4F5-4CCE-9C81-0B927807C75F}" type="pres">
       <dgm:prSet presAssocID="{1E1C5F0D-6809-4ADE-9729-8CCDBAC80580}" presName="hierRoot2" presStyleCnt="0">
@@ -7551,8 +7600,8 @@
     <dgm:cxn modelId="{BCC6B83A-7936-40A5-9697-16D6930A7B9E}" type="presOf" srcId="{EAA99F44-A3C6-4E95-97A5-8E48D91791F4}" destId="{3FF53181-E0C7-4DE2-BB83-60F5EA1F0BBB}" srcOrd="0" destOrd="0" presId="urn:microsoft.com/office/officeart/2005/8/layout/orgChart1"/>
     <dgm:cxn modelId="{4C0A3ECD-77AA-4ADF-810C-32A809311CD3}" type="presOf" srcId="{FEA43164-78BB-4576-BB9F-6EFBA64899A5}" destId="{CE7287BB-770F-4467-AACA-4F9CB6550331}" srcOrd="0" destOrd="0" presId="urn:microsoft.com/office/officeart/2005/8/layout/orgChart1"/>
     <dgm:cxn modelId="{1879E101-DA27-49EA-95AB-EC63798C5E4A}" type="presOf" srcId="{FF241F39-7578-418C-B7CA-1B16773286B6}" destId="{12FBB07A-EF12-4659-9B60-9C4408D29459}" srcOrd="0" destOrd="0" presId="urn:microsoft.com/office/officeart/2005/8/layout/orgChart1"/>
+    <dgm:cxn modelId="{FA72DBD1-FE51-4DFB-90F9-95BDE22EA0AE}" type="presOf" srcId="{0C88399B-163D-4A29-961B-6BF22C1DF766}" destId="{8A0E2659-AFF4-4797-8AF8-2697EA472E1B}" srcOrd="0" destOrd="0" presId="urn:microsoft.com/office/officeart/2005/8/layout/orgChart1"/>
     <dgm:cxn modelId="{2B970364-665F-41AB-AE3F-77384AF2F7E3}" type="presOf" srcId="{918F8596-A938-402C-9203-FD8C6D0DFA2E}" destId="{A90E911F-0BD2-4021-B237-B35DB6616323}" srcOrd="0" destOrd="0" presId="urn:microsoft.com/office/officeart/2005/8/layout/orgChart1"/>
-    <dgm:cxn modelId="{FA72DBD1-FE51-4DFB-90F9-95BDE22EA0AE}" type="presOf" srcId="{0C88399B-163D-4A29-961B-6BF22C1DF766}" destId="{8A0E2659-AFF4-4797-8AF8-2697EA472E1B}" srcOrd="0" destOrd="0" presId="urn:microsoft.com/office/officeart/2005/8/layout/orgChart1"/>
     <dgm:cxn modelId="{8D85B8E3-CA5A-440C-ADFC-CD63C2434FC1}" type="presOf" srcId="{07A2CDFB-D5DB-4B18-B9F2-416B0445CD21}" destId="{636DBB0D-635D-4B2A-8ABC-88AE0A8EDD1D}" srcOrd="1" destOrd="0" presId="urn:microsoft.com/office/officeart/2005/8/layout/orgChart1"/>
     <dgm:cxn modelId="{D7D17ECF-2924-4AFA-A49B-85BB0D9B901A}" type="presOf" srcId="{FDBB0B66-E7F2-4EA7-B793-182694B0CF9B}" destId="{A085CD96-C286-4F3A-B38E-919252F4A3E5}" srcOrd="0" destOrd="0" presId="urn:microsoft.com/office/officeart/2005/8/layout/orgChart1"/>
     <dgm:cxn modelId="{A9FDD4A5-2C94-49F3-AB6B-371F10CF324A}" srcId="{944C7CBF-6A68-4CC4-9C85-AA411441FF77}" destId="{5DD75738-D8B4-4941-B749-B53551EF13FB}" srcOrd="2" destOrd="0" parTransId="{FEA43164-78BB-4576-BB9F-6EFBA64899A5}" sibTransId="{6DD01451-7056-46E8-AFED-3D581D80AE5C}"/>
@@ -7563,9 +7612,9 @@
     <dgm:cxn modelId="{B5F33D60-47F3-4CF9-A56B-E8FBD4DEC61F}" type="presOf" srcId="{D4D88372-FCC7-4F2D-9F5F-AC0CD55C5716}" destId="{33F3ACF9-4B00-4304-B6B5-DB035AA93F7D}" srcOrd="0" destOrd="0" presId="urn:microsoft.com/office/officeart/2005/8/layout/orgChart1"/>
     <dgm:cxn modelId="{FA330574-D8D1-4F79-9132-410097A7C69E}" type="presOf" srcId="{BFEFB38F-1589-4005-A2E7-C87D4F1E4884}" destId="{D1E30C54-0DF8-4C99-9AEC-D679B910022E}" srcOrd="1" destOrd="0" presId="urn:microsoft.com/office/officeart/2005/8/layout/orgChart1"/>
     <dgm:cxn modelId="{EA062D5A-2013-4AC1-AD52-3BE1F1ED3E4B}" type="presOf" srcId="{AAB28CAD-F8AD-4481-9DFB-7F0927811735}" destId="{B621274D-A994-469A-A619-6DEF63C755C3}" srcOrd="0" destOrd="0" presId="urn:microsoft.com/office/officeart/2005/8/layout/orgChart1"/>
+    <dgm:cxn modelId="{FFD88B64-8EA9-4898-928C-A16ED4E0E5F4}" srcId="{BFEFB38F-1589-4005-A2E7-C87D4F1E4884}" destId="{6D9B7A75-A72B-4D7F-8219-8867F77F8626}" srcOrd="6" destOrd="0" parTransId="{8B311CEE-CFBE-4DE2-8DA9-CFB266F73D9C}" sibTransId="{6871140C-A710-43BA-B86D-D6567A2F827D}"/>
+    <dgm:cxn modelId="{23B70A28-D705-42D6-AE9B-4C07912222FE}" type="presOf" srcId="{CC4A61D6-D8A5-4BC3-B5A0-AA1A4DE9FA25}" destId="{E6F8B108-9D50-4991-945A-54D126B24F12}" srcOrd="0" destOrd="0" presId="urn:microsoft.com/office/officeart/2005/8/layout/orgChart1"/>
     <dgm:cxn modelId="{CC46517D-3DB0-4AFE-8AD2-0E3817C99667}" type="presOf" srcId="{1E1C5F0D-6809-4ADE-9729-8CCDBAC80580}" destId="{C7976194-23A0-40F5-A44A-DEFD3DED26F6}" srcOrd="0" destOrd="0" presId="urn:microsoft.com/office/officeart/2005/8/layout/orgChart1"/>
-    <dgm:cxn modelId="{23B70A28-D705-42D6-AE9B-4C07912222FE}" type="presOf" srcId="{CC4A61D6-D8A5-4BC3-B5A0-AA1A4DE9FA25}" destId="{E6F8B108-9D50-4991-945A-54D126B24F12}" srcOrd="0" destOrd="0" presId="urn:microsoft.com/office/officeart/2005/8/layout/orgChart1"/>
-    <dgm:cxn modelId="{FFD88B64-8EA9-4898-928C-A16ED4E0E5F4}" srcId="{BFEFB38F-1589-4005-A2E7-C87D4F1E4884}" destId="{6D9B7A75-A72B-4D7F-8219-8867F77F8626}" srcOrd="6" destOrd="0" parTransId="{8B311CEE-CFBE-4DE2-8DA9-CFB266F73D9C}" sibTransId="{6871140C-A710-43BA-B86D-D6567A2F827D}"/>
     <dgm:cxn modelId="{3F8E28C8-2248-448D-8AAF-7ED703B2F760}" type="presOf" srcId="{29C8FA91-AE4D-45E5-B255-08076F71872F}" destId="{A0010744-2EE9-4F1A-AD23-013C2EEE7205}" srcOrd="0" destOrd="0" presId="urn:microsoft.com/office/officeart/2005/8/layout/orgChart1"/>
     <dgm:cxn modelId="{00FC31F1-2228-45C7-8FFF-6B1F5E5F9AE8}" srcId="{944C7CBF-6A68-4CC4-9C85-AA411441FF77}" destId="{07A2CDFB-D5DB-4B18-B9F2-416B0445CD21}" srcOrd="0" destOrd="0" parTransId="{CA968B4D-F942-492C-8A65-5B3C9A9D82EB}" sibTransId="{01B708F0-2212-4FC5-9666-18815B800CFF}"/>
     <dgm:cxn modelId="{DC13F892-2D4A-4E4F-B0FE-D143B500A95C}" type="presOf" srcId="{B034753F-312E-42EB-80B6-DF1C2F3C90A9}" destId="{E89D45D3-BA4E-43E0-B779-B1DE4750445C}" srcOrd="0" destOrd="0" presId="urn:microsoft.com/office/officeart/2005/8/layout/orgChart1"/>
@@ -7603,16 +7652,16 @@
     <dgm:cxn modelId="{55044D1E-5CD1-446E-8FFE-CF11B5F09C50}" srcId="{BFEFB38F-1589-4005-A2E7-C87D4F1E4884}" destId="{E30A2E5D-95D4-4AFB-B050-ECD4D25BE7A7}" srcOrd="0" destOrd="0" parTransId="{CC4A61D6-D8A5-4BC3-B5A0-AA1A4DE9FA25}" sibTransId="{4C9BE443-9CEA-49B7-9B44-047D42DD3AC4}"/>
     <dgm:cxn modelId="{D98D7A37-B8C6-4357-A53E-46AA04ADBD8B}" type="presOf" srcId="{C3983BFD-148D-4C17-9E53-2E22E2E8A701}" destId="{79D733A0-F645-4FBC-8550-FBD4F57EF353}" srcOrd="0" destOrd="0" presId="urn:microsoft.com/office/officeart/2005/8/layout/orgChart1"/>
     <dgm:cxn modelId="{2D79885A-1761-4570-9A60-546FD6B9BF56}" type="presOf" srcId="{95A9FD75-3B8B-4A2F-927A-8BD12A964AEA}" destId="{1DC66CA8-A7CA-43F5-A244-D4717C9D871D}" srcOrd="0" destOrd="0" presId="urn:microsoft.com/office/officeart/2005/8/layout/orgChart1"/>
+    <dgm:cxn modelId="{0C82A4CA-6325-4FDB-A3E8-1D7172435A4E}" srcId="{29C8FA91-AE4D-45E5-B255-08076F71872F}" destId="{FDBB0B66-E7F2-4EA7-B793-182694B0CF9B}" srcOrd="7" destOrd="0" parTransId="{169E703C-C691-4BD8-A432-D6AF61DE03A2}" sibTransId="{F7DD96D2-2386-43CC-B061-0B9D867C9073}"/>
     <dgm:cxn modelId="{7E85FD14-715B-450F-9889-96E2DA7442A6}" type="presOf" srcId="{F970E238-8374-4E8E-8D7B-BD43A041F666}" destId="{A6FFA89F-9104-4F54-ABDD-63FF12F42FAF}" srcOrd="1" destOrd="0" presId="urn:microsoft.com/office/officeart/2005/8/layout/orgChart1"/>
-    <dgm:cxn modelId="{0C82A4CA-6325-4FDB-A3E8-1D7172435A4E}" srcId="{29C8FA91-AE4D-45E5-B255-08076F71872F}" destId="{FDBB0B66-E7F2-4EA7-B793-182694B0CF9B}" srcOrd="7" destOrd="0" parTransId="{169E703C-C691-4BD8-A432-D6AF61DE03A2}" sibTransId="{F7DD96D2-2386-43CC-B061-0B9D867C9073}"/>
     <dgm:cxn modelId="{86E9DE75-78CC-4387-83E2-84FAF33B3BEA}" srcId="{29C8FA91-AE4D-45E5-B255-08076F71872F}" destId="{3826C857-3079-46B3-9D4F-B93629A019A0}" srcOrd="0" destOrd="0" parTransId="{E7094BF2-B8C7-44D2-8BF2-090ED43ECC72}" sibTransId="{9D4D1F5E-1748-4BFD-BEDB-B2098F9324EE}"/>
     <dgm:cxn modelId="{2AB83C75-74A8-4B65-A0FC-81AAF48F637B}" type="presOf" srcId="{C89C001A-0438-4034-B81C-C5287B5A3E65}" destId="{08CD08AA-4126-4C67-9CC1-ACC2CDA58C17}" srcOrd="1" destOrd="0" presId="urn:microsoft.com/office/officeart/2005/8/layout/orgChart1"/>
     <dgm:cxn modelId="{6ECE2111-EE0B-49A8-8321-A69568A42119}" type="presOf" srcId="{09978D98-A5C7-4006-9338-748D6CB97DBB}" destId="{D6866184-A28B-4C57-9371-E3463E6FE308}" srcOrd="0" destOrd="0" presId="urn:microsoft.com/office/officeart/2005/8/layout/orgChart1"/>
     <dgm:cxn modelId="{E84539B7-1672-4A5B-9B83-38E10514468A}" type="presOf" srcId="{6D9B7A75-A72B-4D7F-8219-8867F77F8626}" destId="{94652286-7F2D-4284-850C-0B3EE12307BF}" srcOrd="0" destOrd="0" presId="urn:microsoft.com/office/officeart/2005/8/layout/orgChart1"/>
     <dgm:cxn modelId="{F387D727-857A-4204-8BA5-59D9FA6C07DA}" type="presOf" srcId="{BEE3EB96-AC9A-432A-9783-915FD9AB6EE4}" destId="{115CF24E-8912-44F8-9ED5-AFE2AC3DF074}" srcOrd="0" destOrd="0" presId="urn:microsoft.com/office/officeart/2005/8/layout/orgChart1"/>
     <dgm:cxn modelId="{C0C55DA3-CF7E-4446-8136-CFF1C7C4ECF6}" type="presOf" srcId="{944C7CBF-6A68-4CC4-9C85-AA411441FF77}" destId="{D8F674A6-017A-423C-89ED-E304BD5B9986}" srcOrd="1" destOrd="0" presId="urn:microsoft.com/office/officeart/2005/8/layout/orgChart1"/>
+    <dgm:cxn modelId="{6A815819-3702-40B2-B300-CB2704386A38}" type="presOf" srcId="{95A9FD75-3B8B-4A2F-927A-8BD12A964AEA}" destId="{E298EA0F-CA4B-4C25-96F3-43827F36A48F}" srcOrd="1" destOrd="0" presId="urn:microsoft.com/office/officeart/2005/8/layout/orgChart1"/>
     <dgm:cxn modelId="{19A19A97-68C8-494C-9FAD-B595EA680EB4}" type="presOf" srcId="{7D22B8C7-AC59-4C55-8CB0-20C871BEB24D}" destId="{CBBB1FA1-C2C4-4AE1-8B8F-415C0481D25A}" srcOrd="1" destOrd="0" presId="urn:microsoft.com/office/officeart/2005/8/layout/orgChart1"/>
-    <dgm:cxn modelId="{6A815819-3702-40B2-B300-CB2704386A38}" type="presOf" srcId="{95A9FD75-3B8B-4A2F-927A-8BD12A964AEA}" destId="{E298EA0F-CA4B-4C25-96F3-43827F36A48F}" srcOrd="1" destOrd="0" presId="urn:microsoft.com/office/officeart/2005/8/layout/orgChart1"/>
     <dgm:cxn modelId="{2C58FB3B-A981-4499-8F03-4188461650BF}" srcId="{944C7CBF-6A68-4CC4-9C85-AA411441FF77}" destId="{C89C001A-0438-4034-B81C-C5287B5A3E65}" srcOrd="5" destOrd="0" parTransId="{DAA9F616-0324-4D51-8F0C-536A33836ACB}" sibTransId="{7CC9FC17-1573-4B24-B125-C6DD19093DAC}"/>
     <dgm:cxn modelId="{EA727220-2368-4607-930A-71E90CEF6B0A}" type="presOf" srcId="{D6D52D27-F768-4AF0-B636-BBA5B57417CC}" destId="{0A655C83-7DE5-4512-BA16-CD0FFEFCE780}" srcOrd="1" destOrd="0" presId="urn:microsoft.com/office/officeart/2005/8/layout/orgChart1"/>
     <dgm:cxn modelId="{B7ACD695-6F6F-4D01-9887-B57EEF0CAA0F}" type="presOf" srcId="{56ED7863-34E5-4C53-A81E-5D1345C8CD8E}" destId="{93F39B9E-6563-4B71-92A7-0AA89A98B35A}" srcOrd="0" destOrd="0" presId="urn:microsoft.com/office/officeart/2005/8/layout/orgChart1"/>
@@ -11560,14 +11609,7 @@
               <a:latin typeface="Times New Roman" panose="02020603050405020304" pitchFamily="18" charset="0"/>
               <a:cs typeface="Times New Roman" panose="02020603050405020304" pitchFamily="18" charset="0"/>
             </a:rPr>
-            <a:t>Update </a:t>
-          </a:r>
-          <a:r>
-            <a:rPr lang="en-US" sz="1100" kern="1200" smtClean="0">
-              <a:latin typeface="Times New Roman" panose="02020603050405020304" pitchFamily="18" charset="0"/>
-              <a:cs typeface="Times New Roman" panose="02020603050405020304" pitchFamily="18" charset="0"/>
-            </a:rPr>
-            <a:t>profile</a:t>
+            <a:t>Update profile</a:t>
           </a:r>
           <a:endParaRPr lang="en-US" sz="1100" kern="1200">
             <a:latin typeface="Times New Roman" panose="02020603050405020304" pitchFamily="18" charset="0"/>
@@ -13072,14 +13114,7 @@
               <a:latin typeface="Times New Roman" panose="02020603050405020304" pitchFamily="18" charset="0"/>
               <a:cs typeface="Times New Roman" panose="02020603050405020304" pitchFamily="18" charset="0"/>
             </a:rPr>
-            <a:t>Update </a:t>
-          </a:r>
-          <a:r>
-            <a:rPr lang="en-US" sz="1100" kern="1200" smtClean="0">
-              <a:latin typeface="Times New Roman" panose="02020603050405020304" pitchFamily="18" charset="0"/>
-              <a:cs typeface="Times New Roman" panose="02020603050405020304" pitchFamily="18" charset="0"/>
-            </a:rPr>
-            <a:t>profile</a:t>
+            <a:t>Update profile</a:t>
           </a:r>
           <a:endParaRPr lang="en-US" sz="1100" kern="1200">
             <a:latin typeface="Times New Roman" panose="02020603050405020304" pitchFamily="18" charset="0"/>
@@ -18008,7 +18043,7 @@
           <a:p>
             <a:fld id="{89F87741-D5A9-4EC8-8E89-5D54608ECCCA}" type="datetimeFigureOut">
               <a:rPr lang="en-US" smtClean="0"/>
-              <a:t>06 - 05 - 2019</a:t>
+              <a:t>08 - 05 - 2019</a:t>
             </a:fld>
             <a:endParaRPr lang="en-US"/>
           </a:p>
@@ -18830,7 +18865,7 @@
           <a:p>
             <a:fld id="{69D90045-0D5B-4A86-88EA-BBB2805802CB}" type="datetime1">
               <a:rPr lang="en-US" smtClean="0"/>
-              <a:t>06 - 05 - 2019</a:t>
+              <a:t>08 - 05 - 2019</a:t>
             </a:fld>
             <a:endParaRPr lang="en-US"/>
           </a:p>
@@ -19699,7 +19734,7 @@
           <a:p>
             <a:fld id="{59347B6F-DDC2-40C5-A73C-643F579E89EE}" type="datetime1">
               <a:rPr lang="en-US" smtClean="0"/>
-              <a:t>06 - 05 - 2019</a:t>
+              <a:t>08 - 05 - 2019</a:t>
             </a:fld>
             <a:endParaRPr lang="en-US"/>
           </a:p>
@@ -19874,7 +19909,7 @@
           <a:p>
             <a:fld id="{8A02277F-A17D-4366-9156-8953CBA59ADA}" type="datetime1">
               <a:rPr lang="en-US" smtClean="0"/>
-              <a:t>06 - 05 - 2019</a:t>
+              <a:t>08 - 05 - 2019</a:t>
             </a:fld>
             <a:endParaRPr lang="en-US"/>
           </a:p>
@@ -20044,7 +20079,7 @@
           <a:p>
             <a:fld id="{BDAD00F1-995C-4A41-BDA8-DDB48BA681B1}" type="datetime1">
               <a:rPr lang="en-US" smtClean="0"/>
-              <a:t>06 - 05 - 2019</a:t>
+              <a:t>08 - 05 - 2019</a:t>
             </a:fld>
             <a:endParaRPr lang="en-US"/>
           </a:p>
@@ -20254,7 +20289,7 @@
           <a:p>
             <a:fld id="{16C762C4-8C4F-449E-B280-0854CF0A6717}" type="datetime1">
               <a:rPr lang="en-US" smtClean="0"/>
-              <a:t>06 - 05 - 2019</a:t>
+              <a:t>08 - 05 - 2019</a:t>
             </a:fld>
             <a:endParaRPr lang="en-US"/>
           </a:p>
@@ -21068,7 +21103,7 @@
           <a:p>
             <a:fld id="{B8DD4C73-9867-4F61-BAD2-73E3ACAE8984}" type="datetime1">
               <a:rPr lang="en-US" smtClean="0"/>
-              <a:t>06 - 05 - 2019</a:t>
+              <a:t>08 - 05 - 2019</a:t>
             </a:fld>
             <a:endParaRPr lang="en-US"/>
           </a:p>
@@ -21304,7 +21339,7 @@
           <a:p>
             <a:fld id="{0A16DE99-8757-4149-8F23-CFFA2BD178B8}" type="datetime1">
               <a:rPr lang="en-US" smtClean="0"/>
-              <a:t>06 - 05 - 2019</a:t>
+              <a:t>08 - 05 - 2019</a:t>
             </a:fld>
             <a:endParaRPr lang="en-US"/>
           </a:p>
@@ -21627,7 +21662,7 @@
           <a:p>
             <a:fld id="{4D8526AC-95C7-45B7-ADD2-45B8704F3A37}" type="datetime1">
               <a:rPr lang="en-US" smtClean="0"/>
-              <a:t>06 - 05 - 2019</a:t>
+              <a:t>08 - 05 - 2019</a:t>
             </a:fld>
             <a:endParaRPr lang="en-US"/>
           </a:p>
@@ -21717,7 +21752,7 @@
           <a:p>
             <a:fld id="{B756A492-A397-46EB-AA86-F02B53E04786}" type="datetime1">
               <a:rPr lang="en-US" smtClean="0"/>
-              <a:t>06 - 05 - 2019</a:t>
+              <a:t>08 - 05 - 2019</a:t>
             </a:fld>
             <a:endParaRPr lang="en-US"/>
           </a:p>
@@ -22234,7 +22269,7 @@
           <a:p>
             <a:fld id="{4F647839-F903-4643-A762-E22BD53B416E}" type="datetime1">
               <a:rPr lang="en-US" smtClean="0"/>
-              <a:t>06 - 05 - 2019</a:t>
+              <a:t>08 - 05 - 2019</a:t>
             </a:fld>
             <a:endParaRPr lang="en-US"/>
           </a:p>
@@ -22745,7 +22780,7 @@
           <a:p>
             <a:fld id="{3A44ADF4-CE10-441C-88E8-FBACA3C94392}" type="datetime1">
               <a:rPr lang="en-US" smtClean="0"/>
-              <a:t>06 - 05 - 2019</a:t>
+              <a:t>08 - 05 - 2019</a:t>
             </a:fld>
             <a:endParaRPr lang="en-US"/>
           </a:p>
@@ -22990,7 +23025,7 @@
           <a:p>
             <a:fld id="{859F6309-0A18-4A1A-99F9-8481C7224915}" type="datetime1">
               <a:rPr lang="en-US" smtClean="0"/>
-              <a:t>06 - 05 - 2019</a:t>
+              <a:t>08 - 05 - 2019</a:t>
             </a:fld>
             <a:endParaRPr lang="en-US"/>
           </a:p>
@@ -24824,53 +24859,7 @@
                   <a:reflection blurRad="12700" stA="50000" endPos="50000" dist="5000" dir="5400000" sy="-100000" rotWithShape="0"/>
                 </a:effectLst>
               </a:rPr>
-              <a:t>sites </a:t>
-            </a:r>
-            <a:r>
-              <a:rPr lang="en-US" b="1" cap="all" smtClean="0">
-                <a:ln w="0"/>
-                <a:gradFill flip="none">
-                  <a:gsLst>
-                    <a:gs pos="0">
-                      <a:schemeClr val="accent1">
-                        <a:tint val="75000"/>
-                        <a:shade val="75000"/>
-                        <a:satMod val="170000"/>
-                      </a:schemeClr>
-                    </a:gs>
-                    <a:gs pos="49000">
-                      <a:schemeClr val="accent1">
-                        <a:tint val="88000"/>
-                        <a:shade val="65000"/>
-                        <a:satMod val="172000"/>
-                      </a:schemeClr>
-                    </a:gs>
-                    <a:gs pos="50000">
-                      <a:schemeClr val="accent1">
-                        <a:shade val="65000"/>
-                        <a:satMod val="130000"/>
-                      </a:schemeClr>
-                    </a:gs>
-                    <a:gs pos="92000">
-                      <a:schemeClr val="accent1">
-                        <a:shade val="50000"/>
-                        <a:satMod val="120000"/>
-                      </a:schemeClr>
-                    </a:gs>
-                    <a:gs pos="100000">
-                      <a:schemeClr val="accent1">
-                        <a:shade val="48000"/>
-                        <a:satMod val="120000"/>
-                      </a:schemeClr>
-                    </a:gs>
-                  </a:gsLst>
-                  <a:lin ang="5400000"/>
-                </a:gradFill>
-                <a:effectLst>
-                  <a:reflection blurRad="12700" stA="50000" endPos="50000" dist="5000" dir="5400000" sy="-100000" rotWithShape="0"/>
-                </a:effectLst>
-              </a:rPr>
-              <a:t>(3)</a:t>
+              <a:t>sites (3)</a:t>
             </a:r>
             <a:endParaRPr lang="en-US" b="1" cap="all" dirty="0">
               <a:ln w="0"/>
@@ -24978,11 +24967,7 @@
             <a:pPr algn="ctr"/>
             <a:r>
               <a:rPr lang="en-US" sz="2800" smtClean="0"/>
-              <a:t>Order Detail </a:t>
-            </a:r>
-            <a:r>
-              <a:rPr lang="en-US" sz="2800" smtClean="0"/>
-              <a:t>Page</a:t>
+              <a:t>Order Detail Page</a:t>
             </a:r>
           </a:p>
         </p:txBody>
@@ -25202,53 +25187,7 @@
                   <a:reflection blurRad="12700" stA="50000" endPos="50000" dist="5000" dir="5400000" sy="-100000" rotWithShape="0"/>
                 </a:effectLst>
               </a:rPr>
-              <a:t>sites </a:t>
-            </a:r>
-            <a:r>
-              <a:rPr lang="en-US" b="1" cap="all" smtClean="0">
-                <a:ln w="0"/>
-                <a:gradFill flip="none">
-                  <a:gsLst>
-                    <a:gs pos="0">
-                      <a:schemeClr val="accent1">
-                        <a:tint val="75000"/>
-                        <a:shade val="75000"/>
-                        <a:satMod val="170000"/>
-                      </a:schemeClr>
-                    </a:gs>
-                    <a:gs pos="49000">
-                      <a:schemeClr val="accent1">
-                        <a:tint val="88000"/>
-                        <a:shade val="65000"/>
-                        <a:satMod val="172000"/>
-                      </a:schemeClr>
-                    </a:gs>
-                    <a:gs pos="50000">
-                      <a:schemeClr val="accent1">
-                        <a:shade val="65000"/>
-                        <a:satMod val="130000"/>
-                      </a:schemeClr>
-                    </a:gs>
-                    <a:gs pos="92000">
-                      <a:schemeClr val="accent1">
-                        <a:shade val="50000"/>
-                        <a:satMod val="120000"/>
-                      </a:schemeClr>
-                    </a:gs>
-                    <a:gs pos="100000">
-                      <a:schemeClr val="accent1">
-                        <a:shade val="48000"/>
-                        <a:satMod val="120000"/>
-                      </a:schemeClr>
-                    </a:gs>
-                  </a:gsLst>
-                  <a:lin ang="5400000"/>
-                </a:gradFill>
-                <a:effectLst>
-                  <a:reflection blurRad="12700" stA="50000" endPos="50000" dist="5000" dir="5400000" sy="-100000" rotWithShape="0"/>
-                </a:effectLst>
-              </a:rPr>
-              <a:t>(4)</a:t>
+              <a:t>sites (4)</a:t>
             </a:r>
             <a:endParaRPr lang="en-US" b="1" cap="all" dirty="0">
               <a:ln w="0"/>
@@ -25576,53 +25515,7 @@
                   <a:reflection blurRad="12700" stA="50000" endPos="50000" dist="5000" dir="5400000" sy="-100000" rotWithShape="0"/>
                 </a:effectLst>
               </a:rPr>
-              <a:t>sites </a:t>
-            </a:r>
-            <a:r>
-              <a:rPr lang="en-US" b="1" cap="all" smtClean="0">
-                <a:ln w="0"/>
-                <a:gradFill flip="none">
-                  <a:gsLst>
-                    <a:gs pos="0">
-                      <a:schemeClr val="accent1">
-                        <a:tint val="75000"/>
-                        <a:shade val="75000"/>
-                        <a:satMod val="170000"/>
-                      </a:schemeClr>
-                    </a:gs>
-                    <a:gs pos="49000">
-                      <a:schemeClr val="accent1">
-                        <a:tint val="88000"/>
-                        <a:shade val="65000"/>
-                        <a:satMod val="172000"/>
-                      </a:schemeClr>
-                    </a:gs>
-                    <a:gs pos="50000">
-                      <a:schemeClr val="accent1">
-                        <a:shade val="65000"/>
-                        <a:satMod val="130000"/>
-                      </a:schemeClr>
-                    </a:gs>
-                    <a:gs pos="92000">
-                      <a:schemeClr val="accent1">
-                        <a:shade val="50000"/>
-                        <a:satMod val="120000"/>
-                      </a:schemeClr>
-                    </a:gs>
-                    <a:gs pos="100000">
-                      <a:schemeClr val="accent1">
-                        <a:shade val="48000"/>
-                        <a:satMod val="120000"/>
-                      </a:schemeClr>
-                    </a:gs>
-                  </a:gsLst>
-                  <a:lin ang="5400000"/>
-                </a:gradFill>
-                <a:effectLst>
-                  <a:reflection blurRad="12700" stA="50000" endPos="50000" dist="5000" dir="5400000" sy="-100000" rotWithShape="0"/>
-                </a:effectLst>
-              </a:rPr>
-              <a:t>(5)</a:t>
+              <a:t>sites (5)</a:t>
             </a:r>
             <a:endParaRPr lang="en-US" b="1" cap="all" dirty="0">
               <a:ln w="0"/>
@@ -25730,15 +25623,7 @@
             <a:pPr algn="ctr"/>
             <a:r>
               <a:rPr lang="en-US" sz="2800" smtClean="0"/>
-              <a:t>Contact </a:t>
-            </a:r>
-            <a:r>
-              <a:rPr lang="en-US" sz="2800" smtClean="0"/>
-              <a:t>Detail </a:t>
-            </a:r>
-            <a:r>
-              <a:rPr lang="en-US" sz="2800" smtClean="0"/>
-              <a:t>Page</a:t>
+              <a:t>Contact Detail Page</a:t>
             </a:r>
           </a:p>
         </p:txBody>
@@ -25958,53 +25843,7 @@
                   <a:reflection blurRad="12700" stA="50000" endPos="50000" dist="5000" dir="5400000" sy="-100000" rotWithShape="0"/>
                 </a:effectLst>
               </a:rPr>
-              <a:t>sites </a:t>
-            </a:r>
-            <a:r>
-              <a:rPr lang="en-US" b="1" cap="all" smtClean="0">
-                <a:ln w="0"/>
-                <a:gradFill flip="none">
-                  <a:gsLst>
-                    <a:gs pos="0">
-                      <a:schemeClr val="accent1">
-                        <a:tint val="75000"/>
-                        <a:shade val="75000"/>
-                        <a:satMod val="170000"/>
-                      </a:schemeClr>
-                    </a:gs>
-                    <a:gs pos="49000">
-                      <a:schemeClr val="accent1">
-                        <a:tint val="88000"/>
-                        <a:shade val="65000"/>
-                        <a:satMod val="172000"/>
-                      </a:schemeClr>
-                    </a:gs>
-                    <a:gs pos="50000">
-                      <a:schemeClr val="accent1">
-                        <a:shade val="65000"/>
-                        <a:satMod val="130000"/>
-                      </a:schemeClr>
-                    </a:gs>
-                    <a:gs pos="92000">
-                      <a:schemeClr val="accent1">
-                        <a:shade val="50000"/>
-                        <a:satMod val="120000"/>
-                      </a:schemeClr>
-                    </a:gs>
-                    <a:gs pos="100000">
-                      <a:schemeClr val="accent1">
-                        <a:shade val="48000"/>
-                        <a:satMod val="120000"/>
-                      </a:schemeClr>
-                    </a:gs>
-                  </a:gsLst>
-                  <a:lin ang="5400000"/>
-                </a:gradFill>
-                <a:effectLst>
-                  <a:reflection blurRad="12700" stA="50000" endPos="50000" dist="5000" dir="5400000" sy="-100000" rotWithShape="0"/>
-                </a:effectLst>
-              </a:rPr>
-              <a:t>(6)</a:t>
+              <a:t>sites (6)</a:t>
             </a:r>
             <a:endParaRPr lang="en-US" b="1" cap="all" dirty="0">
               <a:ln w="0"/>
@@ -26332,53 +26171,7 @@
                   <a:reflection blurRad="12700" stA="50000" endPos="50000" dist="5000" dir="5400000" sy="-100000" rotWithShape="0"/>
                 </a:effectLst>
               </a:rPr>
-              <a:t>sites </a:t>
-            </a:r>
-            <a:r>
-              <a:rPr lang="en-US" b="1" cap="all" smtClean="0">
-                <a:ln w="0"/>
-                <a:gradFill flip="none">
-                  <a:gsLst>
-                    <a:gs pos="0">
-                      <a:schemeClr val="accent1">
-                        <a:tint val="75000"/>
-                        <a:shade val="75000"/>
-                        <a:satMod val="170000"/>
-                      </a:schemeClr>
-                    </a:gs>
-                    <a:gs pos="49000">
-                      <a:schemeClr val="accent1">
-                        <a:tint val="88000"/>
-                        <a:shade val="65000"/>
-                        <a:satMod val="172000"/>
-                      </a:schemeClr>
-                    </a:gs>
-                    <a:gs pos="50000">
-                      <a:schemeClr val="accent1">
-                        <a:shade val="65000"/>
-                        <a:satMod val="130000"/>
-                      </a:schemeClr>
-                    </a:gs>
-                    <a:gs pos="92000">
-                      <a:schemeClr val="accent1">
-                        <a:shade val="50000"/>
-                        <a:satMod val="120000"/>
-                      </a:schemeClr>
-                    </a:gs>
-                    <a:gs pos="100000">
-                      <a:schemeClr val="accent1">
-                        <a:shade val="48000"/>
-                        <a:satMod val="120000"/>
-                      </a:schemeClr>
-                    </a:gs>
-                  </a:gsLst>
-                  <a:lin ang="5400000"/>
-                </a:gradFill>
-                <a:effectLst>
-                  <a:reflection blurRad="12700" stA="50000" endPos="50000" dist="5000" dir="5400000" sy="-100000" rotWithShape="0"/>
-                </a:effectLst>
-              </a:rPr>
-              <a:t>(7)</a:t>
+              <a:t>sites (7)</a:t>
             </a:r>
             <a:endParaRPr lang="en-US" b="1" cap="all" dirty="0">
               <a:ln w="0"/>
@@ -26488,7 +26281,6 @@
               <a:rPr lang="en-US" sz="2800" smtClean="0"/>
               <a:t>Profile Page</a:t>
             </a:r>
-            <a:endParaRPr lang="en-US" sz="2800" smtClean="0"/>
           </a:p>
         </p:txBody>
       </p:sp>
@@ -26707,53 +26499,7 @@
                   <a:reflection blurRad="12700" stA="50000" endPos="50000" dist="5000" dir="5400000" sy="-100000" rotWithShape="0"/>
                 </a:effectLst>
               </a:rPr>
-              <a:t>sites </a:t>
-            </a:r>
-            <a:r>
-              <a:rPr lang="en-US" b="1" cap="all" smtClean="0">
-                <a:ln w="0"/>
-                <a:gradFill flip="none">
-                  <a:gsLst>
-                    <a:gs pos="0">
-                      <a:schemeClr val="accent1">
-                        <a:tint val="75000"/>
-                        <a:shade val="75000"/>
-                        <a:satMod val="170000"/>
-                      </a:schemeClr>
-                    </a:gs>
-                    <a:gs pos="49000">
-                      <a:schemeClr val="accent1">
-                        <a:tint val="88000"/>
-                        <a:shade val="65000"/>
-                        <a:satMod val="172000"/>
-                      </a:schemeClr>
-                    </a:gs>
-                    <a:gs pos="50000">
-                      <a:schemeClr val="accent1">
-                        <a:shade val="65000"/>
-                        <a:satMod val="130000"/>
-                      </a:schemeClr>
-                    </a:gs>
-                    <a:gs pos="92000">
-                      <a:schemeClr val="accent1">
-                        <a:shade val="50000"/>
-                        <a:satMod val="120000"/>
-                      </a:schemeClr>
-                    </a:gs>
-                    <a:gs pos="100000">
-                      <a:schemeClr val="accent1">
-                        <a:shade val="48000"/>
-                        <a:satMod val="120000"/>
-                      </a:schemeClr>
-                    </a:gs>
-                  </a:gsLst>
-                  <a:lin ang="5400000"/>
-                </a:gradFill>
-                <a:effectLst>
-                  <a:reflection blurRad="12700" stA="50000" endPos="50000" dist="5000" dir="5400000" sy="-100000" rotWithShape="0"/>
-                </a:effectLst>
-              </a:rPr>
-              <a:t>(8)</a:t>
+              <a:t>sites (8)</a:t>
             </a:r>
             <a:endParaRPr lang="en-US" b="1" cap="all" dirty="0">
               <a:ln w="0"/>
@@ -26863,7 +26609,6 @@
               <a:rPr lang="en-US" sz="2800" smtClean="0"/>
               <a:t>Add Staff Page</a:t>
             </a:r>
-            <a:endParaRPr lang="en-US" sz="2800" smtClean="0"/>
           </a:p>
         </p:txBody>
       </p:sp>
@@ -27082,53 +26827,7 @@
                   <a:reflection blurRad="12700" stA="50000" endPos="50000" dist="5000" dir="5400000" sy="-100000" rotWithShape="0"/>
                 </a:effectLst>
               </a:rPr>
-              <a:t>sites </a:t>
-            </a:r>
-            <a:r>
-              <a:rPr lang="en-US" b="1" cap="all" smtClean="0">
-                <a:ln w="0"/>
-                <a:gradFill flip="none">
-                  <a:gsLst>
-                    <a:gs pos="0">
-                      <a:schemeClr val="accent1">
-                        <a:tint val="75000"/>
-                        <a:shade val="75000"/>
-                        <a:satMod val="170000"/>
-                      </a:schemeClr>
-                    </a:gs>
-                    <a:gs pos="49000">
-                      <a:schemeClr val="accent1">
-                        <a:tint val="88000"/>
-                        <a:shade val="65000"/>
-                        <a:satMod val="172000"/>
-                      </a:schemeClr>
-                    </a:gs>
-                    <a:gs pos="50000">
-                      <a:schemeClr val="accent1">
-                        <a:shade val="65000"/>
-                        <a:satMod val="130000"/>
-                      </a:schemeClr>
-                    </a:gs>
-                    <a:gs pos="92000">
-                      <a:schemeClr val="accent1">
-                        <a:shade val="50000"/>
-                        <a:satMod val="120000"/>
-                      </a:schemeClr>
-                    </a:gs>
-                    <a:gs pos="100000">
-                      <a:schemeClr val="accent1">
-                        <a:shade val="48000"/>
-                        <a:satMod val="120000"/>
-                      </a:schemeClr>
-                    </a:gs>
-                  </a:gsLst>
-                  <a:lin ang="5400000"/>
-                </a:gradFill>
-                <a:effectLst>
-                  <a:reflection blurRad="12700" stA="50000" endPos="50000" dist="5000" dir="5400000" sy="-100000" rotWithShape="0"/>
-                </a:effectLst>
-              </a:rPr>
-              <a:t>(9)</a:t>
+              <a:t>sites (9)</a:t>
             </a:r>
             <a:endParaRPr lang="en-US" b="1" cap="all" dirty="0">
               <a:ln w="0"/>
@@ -27683,53 +27382,7 @@
                   <a:reflection blurRad="12700" stA="50000" endPos="50000" dist="5000" dir="5400000" sy="-100000" rotWithShape="0"/>
                 </a:effectLst>
               </a:rPr>
-              <a:t>sites </a:t>
-            </a:r>
-            <a:r>
-              <a:rPr lang="en-US" b="1" cap="all" smtClean="0">
-                <a:ln w="0"/>
-                <a:gradFill flip="none">
-                  <a:gsLst>
-                    <a:gs pos="0">
-                      <a:schemeClr val="accent1">
-                        <a:tint val="75000"/>
-                        <a:shade val="75000"/>
-                        <a:satMod val="170000"/>
-                      </a:schemeClr>
-                    </a:gs>
-                    <a:gs pos="49000">
-                      <a:schemeClr val="accent1">
-                        <a:tint val="88000"/>
-                        <a:shade val="65000"/>
-                        <a:satMod val="172000"/>
-                      </a:schemeClr>
-                    </a:gs>
-                    <a:gs pos="50000">
-                      <a:schemeClr val="accent1">
-                        <a:shade val="65000"/>
-                        <a:satMod val="130000"/>
-                      </a:schemeClr>
-                    </a:gs>
-                    <a:gs pos="92000">
-                      <a:schemeClr val="accent1">
-                        <a:shade val="50000"/>
-                        <a:satMod val="120000"/>
-                      </a:schemeClr>
-                    </a:gs>
-                    <a:gs pos="100000">
-                      <a:schemeClr val="accent1">
-                        <a:shade val="48000"/>
-                        <a:satMod val="120000"/>
-                      </a:schemeClr>
-                    </a:gs>
-                  </a:gsLst>
-                  <a:lin ang="5400000"/>
-                </a:gradFill>
-                <a:effectLst>
-                  <a:reflection blurRad="12700" stA="50000" endPos="50000" dist="5000" dir="5400000" sy="-100000" rotWithShape="0"/>
-                </a:effectLst>
-              </a:rPr>
-              <a:t>(10)</a:t>
+              <a:t>sites (10)</a:t>
             </a:r>
             <a:endParaRPr lang="en-US" b="1" cap="all" dirty="0">
               <a:ln w="0"/>
@@ -27837,13 +27490,8 @@
             <a:pPr algn="ctr"/>
             <a:r>
               <a:rPr lang="en-US" sz="2800" smtClean="0"/>
-              <a:t>Comic </a:t>
+              <a:t>Comic Detail Page</a:t>
             </a:r>
-            <a:r>
-              <a:rPr lang="en-US" sz="2800" smtClean="0"/>
-              <a:t>Detail Page</a:t>
-            </a:r>
-            <a:endParaRPr lang="en-US" sz="2800" smtClean="0"/>
           </a:p>
         </p:txBody>
       </p:sp>
@@ -28062,53 +27710,7 @@
                   <a:reflection blurRad="12700" stA="50000" endPos="50000" dist="5000" dir="5400000" sy="-100000" rotWithShape="0"/>
                 </a:effectLst>
               </a:rPr>
-              <a:t>sites </a:t>
-            </a:r>
-            <a:r>
-              <a:rPr lang="en-US" b="1" cap="all" smtClean="0">
-                <a:ln w="0"/>
-                <a:gradFill flip="none">
-                  <a:gsLst>
-                    <a:gs pos="0">
-                      <a:schemeClr val="accent1">
-                        <a:tint val="75000"/>
-                        <a:shade val="75000"/>
-                        <a:satMod val="170000"/>
-                      </a:schemeClr>
-                    </a:gs>
-                    <a:gs pos="49000">
-                      <a:schemeClr val="accent1">
-                        <a:tint val="88000"/>
-                        <a:shade val="65000"/>
-                        <a:satMod val="172000"/>
-                      </a:schemeClr>
-                    </a:gs>
-                    <a:gs pos="50000">
-                      <a:schemeClr val="accent1">
-                        <a:shade val="65000"/>
-                        <a:satMod val="130000"/>
-                      </a:schemeClr>
-                    </a:gs>
-                    <a:gs pos="92000">
-                      <a:schemeClr val="accent1">
-                        <a:shade val="50000"/>
-                        <a:satMod val="120000"/>
-                      </a:schemeClr>
-                    </a:gs>
-                    <a:gs pos="100000">
-                      <a:schemeClr val="accent1">
-                        <a:shade val="48000"/>
-                        <a:satMod val="120000"/>
-                      </a:schemeClr>
-                    </a:gs>
-                  </a:gsLst>
-                  <a:lin ang="5400000"/>
-                </a:gradFill>
-                <a:effectLst>
-                  <a:reflection blurRad="12700" stA="50000" endPos="50000" dist="5000" dir="5400000" sy="-100000" rotWithShape="0"/>
-                </a:effectLst>
-              </a:rPr>
-              <a:t>(11)</a:t>
+              <a:t>sites (11)</a:t>
             </a:r>
             <a:endParaRPr lang="en-US" b="1" cap="all" dirty="0">
               <a:ln w="0"/>
@@ -28406,53 +28008,7 @@
                   <a:reflection blurRad="12700" stA="50000" endPos="50000" dist="5000" dir="5400000" sy="-100000" rotWithShape="0"/>
                 </a:effectLst>
               </a:rPr>
-              <a:t>sites </a:t>
-            </a:r>
-            <a:r>
-              <a:rPr lang="en-US" b="1" cap="all" smtClean="0">
-                <a:ln w="0"/>
-                <a:gradFill flip="none">
-                  <a:gsLst>
-                    <a:gs pos="0">
-                      <a:schemeClr val="accent1">
-                        <a:tint val="75000"/>
-                        <a:shade val="75000"/>
-                        <a:satMod val="170000"/>
-                      </a:schemeClr>
-                    </a:gs>
-                    <a:gs pos="49000">
-                      <a:schemeClr val="accent1">
-                        <a:tint val="88000"/>
-                        <a:shade val="65000"/>
-                        <a:satMod val="172000"/>
-                      </a:schemeClr>
-                    </a:gs>
-                    <a:gs pos="50000">
-                      <a:schemeClr val="accent1">
-                        <a:shade val="65000"/>
-                        <a:satMod val="130000"/>
-                      </a:schemeClr>
-                    </a:gs>
-                    <a:gs pos="92000">
-                      <a:schemeClr val="accent1">
-                        <a:shade val="50000"/>
-                        <a:satMod val="120000"/>
-                      </a:schemeClr>
-                    </a:gs>
-                    <a:gs pos="100000">
-                      <a:schemeClr val="accent1">
-                        <a:shade val="48000"/>
-                        <a:satMod val="120000"/>
-                      </a:schemeClr>
-                    </a:gs>
-                  </a:gsLst>
-                  <a:lin ang="5400000"/>
-                </a:gradFill>
-                <a:effectLst>
-                  <a:reflection blurRad="12700" stA="50000" endPos="50000" dist="5000" dir="5400000" sy="-100000" rotWithShape="0"/>
-                </a:effectLst>
-              </a:rPr>
-              <a:t>(12)</a:t>
+              <a:t>sites (12)</a:t>
             </a:r>
             <a:endParaRPr lang="en-US" b="1" cap="all" dirty="0">
               <a:ln w="0"/>
@@ -28750,53 +28306,7 @@
                   <a:reflection blurRad="12700" stA="50000" endPos="50000" dist="5000" dir="5400000" sy="-100000" rotWithShape="0"/>
                 </a:effectLst>
               </a:rPr>
-              <a:t>sites </a:t>
-            </a:r>
-            <a:r>
-              <a:rPr lang="en-US" b="1" cap="all" smtClean="0">
-                <a:ln w="0"/>
-                <a:gradFill flip="none">
-                  <a:gsLst>
-                    <a:gs pos="0">
-                      <a:schemeClr val="accent1">
-                        <a:tint val="75000"/>
-                        <a:shade val="75000"/>
-                        <a:satMod val="170000"/>
-                      </a:schemeClr>
-                    </a:gs>
-                    <a:gs pos="49000">
-                      <a:schemeClr val="accent1">
-                        <a:tint val="88000"/>
-                        <a:shade val="65000"/>
-                        <a:satMod val="172000"/>
-                      </a:schemeClr>
-                    </a:gs>
-                    <a:gs pos="50000">
-                      <a:schemeClr val="accent1">
-                        <a:shade val="65000"/>
-                        <a:satMod val="130000"/>
-                      </a:schemeClr>
-                    </a:gs>
-                    <a:gs pos="92000">
-                      <a:schemeClr val="accent1">
-                        <a:shade val="50000"/>
-                        <a:satMod val="120000"/>
-                      </a:schemeClr>
-                    </a:gs>
-                    <a:gs pos="100000">
-                      <a:schemeClr val="accent1">
-                        <a:shade val="48000"/>
-                        <a:satMod val="120000"/>
-                      </a:schemeClr>
-                    </a:gs>
-                  </a:gsLst>
-                  <a:lin ang="5400000"/>
-                </a:gradFill>
-                <a:effectLst>
-                  <a:reflection blurRad="12700" stA="50000" endPos="50000" dist="5000" dir="5400000" sy="-100000" rotWithShape="0"/>
-                </a:effectLst>
-              </a:rPr>
-              <a:t>(13)</a:t>
+              <a:t>sites (13)</a:t>
             </a:r>
             <a:endParaRPr lang="en-US" b="1" cap="all" dirty="0">
               <a:ln w="0"/>
@@ -29094,53 +28604,7 @@
                   <a:reflection blurRad="12700" stA="50000" endPos="50000" dist="5000" dir="5400000" sy="-100000" rotWithShape="0"/>
                 </a:effectLst>
               </a:rPr>
-              <a:t>sites </a:t>
-            </a:r>
-            <a:r>
-              <a:rPr lang="en-US" b="1" cap="all" smtClean="0">
-                <a:ln w="0"/>
-                <a:gradFill flip="none">
-                  <a:gsLst>
-                    <a:gs pos="0">
-                      <a:schemeClr val="accent1">
-                        <a:tint val="75000"/>
-                        <a:shade val="75000"/>
-                        <a:satMod val="170000"/>
-                      </a:schemeClr>
-                    </a:gs>
-                    <a:gs pos="49000">
-                      <a:schemeClr val="accent1">
-                        <a:tint val="88000"/>
-                        <a:shade val="65000"/>
-                        <a:satMod val="172000"/>
-                      </a:schemeClr>
-                    </a:gs>
-                    <a:gs pos="50000">
-                      <a:schemeClr val="accent1">
-                        <a:shade val="65000"/>
-                        <a:satMod val="130000"/>
-                      </a:schemeClr>
-                    </a:gs>
-                    <a:gs pos="92000">
-                      <a:schemeClr val="accent1">
-                        <a:shade val="50000"/>
-                        <a:satMod val="120000"/>
-                      </a:schemeClr>
-                    </a:gs>
-                    <a:gs pos="100000">
-                      <a:schemeClr val="accent1">
-                        <a:shade val="48000"/>
-                        <a:satMod val="120000"/>
-                      </a:schemeClr>
-                    </a:gs>
-                  </a:gsLst>
-                  <a:lin ang="5400000"/>
-                </a:gradFill>
-                <a:effectLst>
-                  <a:reflection blurRad="12700" stA="50000" endPos="50000" dist="5000" dir="5400000" sy="-100000" rotWithShape="0"/>
-                </a:effectLst>
-              </a:rPr>
-              <a:t>(14)</a:t>
+              <a:t>sites (14)</a:t>
             </a:r>
             <a:endParaRPr lang="en-US" b="1" cap="all" dirty="0">
               <a:ln w="0"/>
@@ -29438,53 +28902,7 @@
                   <a:reflection blurRad="12700" stA="50000" endPos="50000" dist="5000" dir="5400000" sy="-100000" rotWithShape="0"/>
                 </a:effectLst>
               </a:rPr>
-              <a:t>sites </a:t>
-            </a:r>
-            <a:r>
-              <a:rPr lang="en-US" b="1" cap="all" smtClean="0">
-                <a:ln w="0"/>
-                <a:gradFill flip="none">
-                  <a:gsLst>
-                    <a:gs pos="0">
-                      <a:schemeClr val="accent1">
-                        <a:tint val="75000"/>
-                        <a:shade val="75000"/>
-                        <a:satMod val="170000"/>
-                      </a:schemeClr>
-                    </a:gs>
-                    <a:gs pos="49000">
-                      <a:schemeClr val="accent1">
-                        <a:tint val="88000"/>
-                        <a:shade val="65000"/>
-                        <a:satMod val="172000"/>
-                      </a:schemeClr>
-                    </a:gs>
-                    <a:gs pos="50000">
-                      <a:schemeClr val="accent1">
-                        <a:shade val="65000"/>
-                        <a:satMod val="130000"/>
-                      </a:schemeClr>
-                    </a:gs>
-                    <a:gs pos="92000">
-                      <a:schemeClr val="accent1">
-                        <a:shade val="50000"/>
-                        <a:satMod val="120000"/>
-                      </a:schemeClr>
-                    </a:gs>
-                    <a:gs pos="100000">
-                      <a:schemeClr val="accent1">
-                        <a:shade val="48000"/>
-                        <a:satMod val="120000"/>
-                      </a:schemeClr>
-                    </a:gs>
-                  </a:gsLst>
-                  <a:lin ang="5400000"/>
-                </a:gradFill>
-                <a:effectLst>
-                  <a:reflection blurRad="12700" stA="50000" endPos="50000" dist="5000" dir="5400000" sy="-100000" rotWithShape="0"/>
-                </a:effectLst>
-              </a:rPr>
-              <a:t>(15)</a:t>
+              <a:t>sites (15)</a:t>
             </a:r>
             <a:endParaRPr lang="en-US" b="1" cap="all" dirty="0">
               <a:ln w="0"/>
@@ -29592,11 +29010,7 @@
             <a:pPr algn="ctr"/>
             <a:r>
               <a:rPr lang="en-US" sz="2800" smtClean="0"/>
-              <a:t>News </a:t>
-            </a:r>
-            <a:r>
-              <a:rPr lang="en-US" sz="2800" smtClean="0"/>
-              <a:t>Detail Page</a:t>
+              <a:t>News Detail Page</a:t>
             </a:r>
             <a:endParaRPr lang="en-US" sz="2800" dirty="0" smtClean="0"/>
           </a:p>
@@ -29817,53 +29231,7 @@
                   <a:reflection blurRad="12700" stA="50000" endPos="50000" dist="5000" dir="5400000" sy="-100000" rotWithShape="0"/>
                 </a:effectLst>
               </a:rPr>
-              <a:t>sites </a:t>
-            </a:r>
-            <a:r>
-              <a:rPr lang="en-US" b="1" cap="all" smtClean="0">
-                <a:ln w="0"/>
-                <a:gradFill flip="none">
-                  <a:gsLst>
-                    <a:gs pos="0">
-                      <a:schemeClr val="accent1">
-                        <a:tint val="75000"/>
-                        <a:shade val="75000"/>
-                        <a:satMod val="170000"/>
-                      </a:schemeClr>
-                    </a:gs>
-                    <a:gs pos="49000">
-                      <a:schemeClr val="accent1">
-                        <a:tint val="88000"/>
-                        <a:shade val="65000"/>
-                        <a:satMod val="172000"/>
-                      </a:schemeClr>
-                    </a:gs>
-                    <a:gs pos="50000">
-                      <a:schemeClr val="accent1">
-                        <a:shade val="65000"/>
-                        <a:satMod val="130000"/>
-                      </a:schemeClr>
-                    </a:gs>
-                    <a:gs pos="92000">
-                      <a:schemeClr val="accent1">
-                        <a:shade val="50000"/>
-                        <a:satMod val="120000"/>
-                      </a:schemeClr>
-                    </a:gs>
-                    <a:gs pos="100000">
-                      <a:schemeClr val="accent1">
-                        <a:shade val="48000"/>
-                        <a:satMod val="120000"/>
-                      </a:schemeClr>
-                    </a:gs>
-                  </a:gsLst>
-                  <a:lin ang="5400000"/>
-                </a:gradFill>
-                <a:effectLst>
-                  <a:reflection blurRad="12700" stA="50000" endPos="50000" dist="5000" dir="5400000" sy="-100000" rotWithShape="0"/>
-                </a:effectLst>
-              </a:rPr>
-              <a:t>(16)</a:t>
+              <a:t>sites (16)</a:t>
             </a:r>
             <a:endParaRPr lang="en-US" b="1" cap="all" dirty="0">
               <a:ln w="0"/>
@@ -31982,11 +31350,7 @@
             <a:pPr algn="ctr"/>
             <a:r>
               <a:rPr lang="en-US" sz="2800" smtClean="0"/>
-              <a:t>Shipping </a:t>
-            </a:r>
-            <a:r>
-              <a:rPr lang="en-US" sz="2800" smtClean="0"/>
-              <a:t>Page</a:t>
+              <a:t>Shipping Page</a:t>
             </a:r>
             <a:endParaRPr lang="en-US" sz="2800" dirty="0" smtClean="0"/>
           </a:p>
@@ -32175,53 +31539,7 @@
                   <a:reflection blurRad="12700" stA="50000" endPos="50000" dist="5000" dir="5400000" sy="-100000" rotWithShape="0"/>
                 </a:effectLst>
               </a:rPr>
-              <a:t>sites </a:t>
-            </a:r>
-            <a:r>
-              <a:rPr lang="en-US" b="1" cap="all" smtClean="0">
-                <a:ln w="0"/>
-                <a:gradFill flip="none">
-                  <a:gsLst>
-                    <a:gs pos="0">
-                      <a:schemeClr val="accent1">
-                        <a:tint val="75000"/>
-                        <a:shade val="75000"/>
-                        <a:satMod val="170000"/>
-                      </a:schemeClr>
-                    </a:gs>
-                    <a:gs pos="49000">
-                      <a:schemeClr val="accent1">
-                        <a:tint val="88000"/>
-                        <a:shade val="65000"/>
-                        <a:satMod val="172000"/>
-                      </a:schemeClr>
-                    </a:gs>
-                    <a:gs pos="50000">
-                      <a:schemeClr val="accent1">
-                        <a:shade val="65000"/>
-                        <a:satMod val="130000"/>
-                      </a:schemeClr>
-                    </a:gs>
-                    <a:gs pos="92000">
-                      <a:schemeClr val="accent1">
-                        <a:shade val="50000"/>
-                        <a:satMod val="120000"/>
-                      </a:schemeClr>
-                    </a:gs>
-                    <a:gs pos="100000">
-                      <a:schemeClr val="accent1">
-                        <a:shade val="48000"/>
-                        <a:satMod val="120000"/>
-                      </a:schemeClr>
-                    </a:gs>
-                  </a:gsLst>
-                  <a:lin ang="5400000"/>
-                </a:gradFill>
-                <a:effectLst>
-                  <a:reflection blurRad="12700" stA="50000" endPos="50000" dist="5000" dir="5400000" sy="-100000" rotWithShape="0"/>
-                </a:effectLst>
-              </a:rPr>
-              <a:t>(8)</a:t>
+              <a:t>sites (8)</a:t>
             </a:r>
             <a:endParaRPr lang="en-US" b="1" cap="all" dirty="0">
               <a:ln w="0"/>
@@ -32339,7 +31657,6 @@
               <a:rPr lang="en-US" sz="2800" smtClean="0"/>
               <a:t>Page</a:t>
             </a:r>
-            <a:endParaRPr lang="en-US" sz="2800" smtClean="0"/>
           </a:p>
         </p:txBody>
       </p:sp>
@@ -32558,53 +31875,7 @@
                   <a:reflection blurRad="12700" stA="50000" endPos="50000" dist="5000" dir="5400000" sy="-100000" rotWithShape="0"/>
                 </a:effectLst>
               </a:rPr>
-              <a:t>sites </a:t>
-            </a:r>
-            <a:r>
-              <a:rPr lang="en-US" b="1" cap="all" smtClean="0">
-                <a:ln w="0"/>
-                <a:gradFill flip="none">
-                  <a:gsLst>
-                    <a:gs pos="0">
-                      <a:schemeClr val="accent1">
-                        <a:tint val="75000"/>
-                        <a:shade val="75000"/>
-                        <a:satMod val="170000"/>
-                      </a:schemeClr>
-                    </a:gs>
-                    <a:gs pos="49000">
-                      <a:schemeClr val="accent1">
-                        <a:tint val="88000"/>
-                        <a:shade val="65000"/>
-                        <a:satMod val="172000"/>
-                      </a:schemeClr>
-                    </a:gs>
-                    <a:gs pos="50000">
-                      <a:schemeClr val="accent1">
-                        <a:shade val="65000"/>
-                        <a:satMod val="130000"/>
-                      </a:schemeClr>
-                    </a:gs>
-                    <a:gs pos="92000">
-                      <a:schemeClr val="accent1">
-                        <a:shade val="50000"/>
-                        <a:satMod val="120000"/>
-                      </a:schemeClr>
-                    </a:gs>
-                    <a:gs pos="100000">
-                      <a:schemeClr val="accent1">
-                        <a:shade val="48000"/>
-                        <a:satMod val="120000"/>
-                      </a:schemeClr>
-                    </a:gs>
-                  </a:gsLst>
-                  <a:lin ang="5400000"/>
-                </a:gradFill>
-                <a:effectLst>
-                  <a:reflection blurRad="12700" stA="50000" endPos="50000" dist="5000" dir="5400000" sy="-100000" rotWithShape="0"/>
-                </a:effectLst>
-              </a:rPr>
-              <a:t>(8)</a:t>
+              <a:t>sites (8)</a:t>
             </a:r>
             <a:endParaRPr lang="en-US" b="1" cap="all" dirty="0">
               <a:ln w="0"/>
@@ -32903,53 +32174,7 @@
                   <a:reflection blurRad="12700" stA="50000" endPos="50000" dist="5000" dir="5400000" sy="-100000" rotWithShape="0"/>
                 </a:effectLst>
               </a:rPr>
-              <a:t>sites </a:t>
-            </a:r>
-            <a:r>
-              <a:rPr lang="en-US" b="1" cap="all" smtClean="0">
-                <a:ln w="0"/>
-                <a:gradFill flip="none">
-                  <a:gsLst>
-                    <a:gs pos="0">
-                      <a:schemeClr val="accent1">
-                        <a:tint val="75000"/>
-                        <a:shade val="75000"/>
-                        <a:satMod val="170000"/>
-                      </a:schemeClr>
-                    </a:gs>
-                    <a:gs pos="49000">
-                      <a:schemeClr val="accent1">
-                        <a:tint val="88000"/>
-                        <a:shade val="65000"/>
-                        <a:satMod val="172000"/>
-                      </a:schemeClr>
-                    </a:gs>
-                    <a:gs pos="50000">
-                      <a:schemeClr val="accent1">
-                        <a:shade val="65000"/>
-                        <a:satMod val="130000"/>
-                      </a:schemeClr>
-                    </a:gs>
-                    <a:gs pos="92000">
-                      <a:schemeClr val="accent1">
-                        <a:shade val="50000"/>
-                        <a:satMod val="120000"/>
-                      </a:schemeClr>
-                    </a:gs>
-                    <a:gs pos="100000">
-                      <a:schemeClr val="accent1">
-                        <a:shade val="48000"/>
-                        <a:satMod val="120000"/>
-                      </a:schemeClr>
-                    </a:gs>
-                  </a:gsLst>
-                  <a:lin ang="5400000"/>
-                </a:gradFill>
-                <a:effectLst>
-                  <a:reflection blurRad="12700" stA="50000" endPos="50000" dist="5000" dir="5400000" sy="-100000" rotWithShape="0"/>
-                </a:effectLst>
-              </a:rPr>
-              <a:t>(9)</a:t>
+              <a:t>sites (9)</a:t>
             </a:r>
             <a:endParaRPr lang="en-US" b="1" cap="all" dirty="0">
               <a:ln w="0"/>
@@ -33057,15 +32282,7 @@
             <a:pPr algn="ctr"/>
             <a:r>
               <a:rPr lang="en-US" sz="2800" smtClean="0"/>
-              <a:t>Customer </a:t>
-            </a:r>
-            <a:r>
-              <a:rPr lang="en-US" sz="2800" smtClean="0"/>
-              <a:t>Profile </a:t>
-            </a:r>
-            <a:r>
-              <a:rPr lang="en-US" sz="2800" smtClean="0"/>
-              <a:t>Page</a:t>
+              <a:t>Customer Profile Page</a:t>
             </a:r>
           </a:p>
         </p:txBody>
@@ -33285,53 +32502,7 @@
                   <a:reflection blurRad="12700" stA="50000" endPos="50000" dist="5000" dir="5400000" sy="-100000" rotWithShape="0"/>
                 </a:effectLst>
               </a:rPr>
-              <a:t>sites </a:t>
-            </a:r>
-            <a:r>
-              <a:rPr lang="en-US" b="1" cap="all" smtClean="0">
-                <a:ln w="0"/>
-                <a:gradFill flip="none">
-                  <a:gsLst>
-                    <a:gs pos="0">
-                      <a:schemeClr val="accent1">
-                        <a:tint val="75000"/>
-                        <a:shade val="75000"/>
-                        <a:satMod val="170000"/>
-                      </a:schemeClr>
-                    </a:gs>
-                    <a:gs pos="49000">
-                      <a:schemeClr val="accent1">
-                        <a:tint val="88000"/>
-                        <a:shade val="65000"/>
-                        <a:satMod val="172000"/>
-                      </a:schemeClr>
-                    </a:gs>
-                    <a:gs pos="50000">
-                      <a:schemeClr val="accent1">
-                        <a:shade val="65000"/>
-                        <a:satMod val="130000"/>
-                      </a:schemeClr>
-                    </a:gs>
-                    <a:gs pos="92000">
-                      <a:schemeClr val="accent1">
-                        <a:shade val="50000"/>
-                        <a:satMod val="120000"/>
-                      </a:schemeClr>
-                    </a:gs>
-                    <a:gs pos="100000">
-                      <a:schemeClr val="accent1">
-                        <a:shade val="48000"/>
-                        <a:satMod val="120000"/>
-                      </a:schemeClr>
-                    </a:gs>
-                  </a:gsLst>
-                  <a:lin ang="5400000"/>
-                </a:gradFill>
-                <a:effectLst>
-                  <a:reflection blurRad="12700" stA="50000" endPos="50000" dist="5000" dir="5400000" sy="-100000" rotWithShape="0"/>
-                </a:effectLst>
-              </a:rPr>
-              <a:t>(10)</a:t>
+              <a:t>sites (10)</a:t>
             </a:r>
             <a:endParaRPr lang="en-US" b="1" cap="all" dirty="0">
               <a:ln w="0"/>
@@ -33629,53 +32800,7 @@
                   <a:reflection blurRad="12700" stA="50000" endPos="50000" dist="5000" dir="5400000" sy="-100000" rotWithShape="0"/>
                 </a:effectLst>
               </a:rPr>
-              <a:t>sites </a:t>
-            </a:r>
-            <a:r>
-              <a:rPr lang="en-US" b="1" cap="all" smtClean="0">
-                <a:ln w="0"/>
-                <a:gradFill flip="none">
-                  <a:gsLst>
-                    <a:gs pos="0">
-                      <a:schemeClr val="accent1">
-                        <a:tint val="75000"/>
-                        <a:shade val="75000"/>
-                        <a:satMod val="170000"/>
-                      </a:schemeClr>
-                    </a:gs>
-                    <a:gs pos="49000">
-                      <a:schemeClr val="accent1">
-                        <a:tint val="88000"/>
-                        <a:shade val="65000"/>
-                        <a:satMod val="172000"/>
-                      </a:schemeClr>
-                    </a:gs>
-                    <a:gs pos="50000">
-                      <a:schemeClr val="accent1">
-                        <a:shade val="65000"/>
-                        <a:satMod val="130000"/>
-                      </a:schemeClr>
-                    </a:gs>
-                    <a:gs pos="92000">
-                      <a:schemeClr val="accent1">
-                        <a:shade val="50000"/>
-                        <a:satMod val="120000"/>
-                      </a:schemeClr>
-                    </a:gs>
-                    <a:gs pos="100000">
-                      <a:schemeClr val="accent1">
-                        <a:shade val="48000"/>
-                        <a:satMod val="120000"/>
-                      </a:schemeClr>
-                    </a:gs>
-                  </a:gsLst>
-                  <a:lin ang="5400000"/>
-                </a:gradFill>
-                <a:effectLst>
-                  <a:reflection blurRad="12700" stA="50000" endPos="50000" dist="5000" dir="5400000" sy="-100000" rotWithShape="0"/>
-                </a:effectLst>
-              </a:rPr>
-              <a:t>(11)</a:t>
+              <a:t>sites (11)</a:t>
             </a:r>
             <a:endParaRPr lang="en-US" b="1" cap="all" dirty="0">
               <a:ln w="0"/>
@@ -33973,53 +33098,7 @@
                   <a:reflection blurRad="12700" stA="50000" endPos="50000" dist="5000" dir="5400000" sy="-100000" rotWithShape="0"/>
                 </a:effectLst>
               </a:rPr>
-              <a:t>sites </a:t>
-            </a:r>
-            <a:r>
-              <a:rPr lang="en-US" b="1" cap="all" smtClean="0">
-                <a:ln w="0"/>
-                <a:gradFill flip="none">
-                  <a:gsLst>
-                    <a:gs pos="0">
-                      <a:schemeClr val="accent1">
-                        <a:tint val="75000"/>
-                        <a:shade val="75000"/>
-                        <a:satMod val="170000"/>
-                      </a:schemeClr>
-                    </a:gs>
-                    <a:gs pos="49000">
-                      <a:schemeClr val="accent1">
-                        <a:tint val="88000"/>
-                        <a:shade val="65000"/>
-                        <a:satMod val="172000"/>
-                      </a:schemeClr>
-                    </a:gs>
-                    <a:gs pos="50000">
-                      <a:schemeClr val="accent1">
-                        <a:shade val="65000"/>
-                        <a:satMod val="130000"/>
-                      </a:schemeClr>
-                    </a:gs>
-                    <a:gs pos="92000">
-                      <a:schemeClr val="accent1">
-                        <a:shade val="50000"/>
-                        <a:satMod val="120000"/>
-                      </a:schemeClr>
-                    </a:gs>
-                    <a:gs pos="100000">
-                      <a:schemeClr val="accent1">
-                        <a:shade val="48000"/>
-                        <a:satMod val="120000"/>
-                      </a:schemeClr>
-                    </a:gs>
-                  </a:gsLst>
-                  <a:lin ang="5400000"/>
-                </a:gradFill>
-                <a:effectLst>
-                  <a:reflection blurRad="12700" stA="50000" endPos="50000" dist="5000" dir="5400000" sy="-100000" rotWithShape="0"/>
-                </a:effectLst>
-              </a:rPr>
-              <a:t>(12)</a:t>
+              <a:t>sites (12)</a:t>
             </a:r>
             <a:endParaRPr lang="en-US" b="1" cap="all" dirty="0">
               <a:ln w="0"/>
@@ -34904,7 +33983,7 @@
           <p:cNvPr id="4" name="Rectangle 3">
             <a:extLst>
               <a:ext uri="{FF2B5EF4-FFF2-40B4-BE49-F238E27FC236}">
-                <a16:creationId xmlns:a16="http://schemas.microsoft.com/office/drawing/2014/main" xmlns="" id="{9BF65F1D-032E-4BC9-965B-AC131CD9699D}"/>
+                <a16:creationId xmlns="" xmlns:a16="http://schemas.microsoft.com/office/drawing/2014/main" id="{9BF65F1D-032E-4BC9-965B-AC131CD9699D}"/>
               </a:ext>
             </a:extLst>
           </p:cNvPr>
@@ -35102,7 +34181,7 @@
           <p:cNvPr id="4" name="Rectangle 3">
             <a:extLst>
               <a:ext uri="{FF2B5EF4-FFF2-40B4-BE49-F238E27FC236}">
-                <a16:creationId xmlns:a16="http://schemas.microsoft.com/office/drawing/2014/main" xmlns="" id="{9BF65F1D-032E-4BC9-965B-AC131CD9699D}"/>
+                <a16:creationId xmlns="" xmlns:a16="http://schemas.microsoft.com/office/drawing/2014/main" id="{9BF65F1D-032E-4BC9-965B-AC131CD9699D}"/>
               </a:ext>
             </a:extLst>
           </p:cNvPr>
@@ -36745,7 +35824,7 @@
       </p:sp>
       <p:pic>
         <p:nvPicPr>
-          <p:cNvPr id="4" name="Picture 2" descr="C:\Users\Sony Vaio\Desktop\manga.png"/>
+          <p:cNvPr id="1026" name="Picture 2" descr="C:\Users\Sony Vaio\Desktop\manga.png"/>
           <p:cNvPicPr>
             <a:picLocks noGrp="1" noChangeAspect="1" noChangeArrowheads="1"/>
           </p:cNvPicPr>
@@ -36768,8 +35847,8 @@
         </p:blipFill>
         <p:spPr bwMode="auto">
           <a:xfrm>
-            <a:off x="457200" y="1333500"/>
-            <a:ext cx="6019800" cy="4250952"/>
+            <a:off x="304800" y="1333500"/>
+            <a:ext cx="6629400" cy="4136383"/>
           </a:xfrm>
           <a:prstGeom prst="rect">
             <a:avLst/>

</xml_diff>